<commit_message>
update figures to journal DPI and fix map legend
</commit_message>
<xml_diff>
--- a/plots/recov.together_textadd.pptx
+++ b/plots/recov.together_textadd.pptx
@@ -243,7 +243,7 @@
           <a:p>
             <a:fld id="{A114BF70-A435-E145-9844-083C89DD5658}" type="datetimeFigureOut">
               <a:rPr lang="en-US" smtClean="0"/>
-              <a:t>12/27/23</a:t>
+              <a:t>12/28/23</a:t>
             </a:fld>
             <a:endParaRPr lang="en-US"/>
           </a:p>
@@ -413,7 +413,7 @@
           <a:p>
             <a:fld id="{A114BF70-A435-E145-9844-083C89DD5658}" type="datetimeFigureOut">
               <a:rPr lang="en-US" smtClean="0"/>
-              <a:t>12/27/23</a:t>
+              <a:t>12/28/23</a:t>
             </a:fld>
             <a:endParaRPr lang="en-US"/>
           </a:p>
@@ -593,7 +593,7 @@
           <a:p>
             <a:fld id="{A114BF70-A435-E145-9844-083C89DD5658}" type="datetimeFigureOut">
               <a:rPr lang="en-US" smtClean="0"/>
-              <a:t>12/27/23</a:t>
+              <a:t>12/28/23</a:t>
             </a:fld>
             <a:endParaRPr lang="en-US"/>
           </a:p>
@@ -763,7 +763,7 @@
           <a:p>
             <a:fld id="{A114BF70-A435-E145-9844-083C89DD5658}" type="datetimeFigureOut">
               <a:rPr lang="en-US" smtClean="0"/>
-              <a:t>12/27/23</a:t>
+              <a:t>12/28/23</a:t>
             </a:fld>
             <a:endParaRPr lang="en-US"/>
           </a:p>
@@ -1009,7 +1009,7 @@
           <a:p>
             <a:fld id="{A114BF70-A435-E145-9844-083C89DD5658}" type="datetimeFigureOut">
               <a:rPr lang="en-US" smtClean="0"/>
-              <a:t>12/27/23</a:t>
+              <a:t>12/28/23</a:t>
             </a:fld>
             <a:endParaRPr lang="en-US"/>
           </a:p>
@@ -1241,7 +1241,7 @@
           <a:p>
             <a:fld id="{A114BF70-A435-E145-9844-083C89DD5658}" type="datetimeFigureOut">
               <a:rPr lang="en-US" smtClean="0"/>
-              <a:t>12/27/23</a:t>
+              <a:t>12/28/23</a:t>
             </a:fld>
             <a:endParaRPr lang="en-US"/>
           </a:p>
@@ -1608,7 +1608,7 @@
           <a:p>
             <a:fld id="{A114BF70-A435-E145-9844-083C89DD5658}" type="datetimeFigureOut">
               <a:rPr lang="en-US" smtClean="0"/>
-              <a:t>12/27/23</a:t>
+              <a:t>12/28/23</a:t>
             </a:fld>
             <a:endParaRPr lang="en-US"/>
           </a:p>
@@ -1726,7 +1726,7 @@
           <a:p>
             <a:fld id="{A114BF70-A435-E145-9844-083C89DD5658}" type="datetimeFigureOut">
               <a:rPr lang="en-US" smtClean="0"/>
-              <a:t>12/27/23</a:t>
+              <a:t>12/28/23</a:t>
             </a:fld>
             <a:endParaRPr lang="en-US"/>
           </a:p>
@@ -1821,7 +1821,7 @@
           <a:p>
             <a:fld id="{A114BF70-A435-E145-9844-083C89DD5658}" type="datetimeFigureOut">
               <a:rPr lang="en-US" smtClean="0"/>
-              <a:t>12/27/23</a:t>
+              <a:t>12/28/23</a:t>
             </a:fld>
             <a:endParaRPr lang="en-US"/>
           </a:p>
@@ -2098,7 +2098,7 @@
           <a:p>
             <a:fld id="{A114BF70-A435-E145-9844-083C89DD5658}" type="datetimeFigureOut">
               <a:rPr lang="en-US" smtClean="0"/>
-              <a:t>12/27/23</a:t>
+              <a:t>12/28/23</a:t>
             </a:fld>
             <a:endParaRPr lang="en-US"/>
           </a:p>
@@ -2355,7 +2355,7 @@
           <a:p>
             <a:fld id="{A114BF70-A435-E145-9844-083C89DD5658}" type="datetimeFigureOut">
               <a:rPr lang="en-US" smtClean="0"/>
-              <a:t>12/27/23</a:t>
+              <a:t>12/28/23</a:t>
             </a:fld>
             <a:endParaRPr lang="en-US"/>
           </a:p>
@@ -2568,7 +2568,7 @@
           <a:p>
             <a:fld id="{A114BF70-A435-E145-9844-083C89DD5658}" type="datetimeFigureOut">
               <a:rPr lang="en-US" smtClean="0"/>
-              <a:t>12/27/23</a:t>
+              <a:t>12/28/23</a:t>
             </a:fld>
             <a:endParaRPr lang="en-US"/>
           </a:p>
@@ -3091,7 +3091,7 @@
         <p:spPr>
           <a:xfrm>
             <a:off x="11776038" y="1053553"/>
-            <a:ext cx="244633" cy="2329797"/>
+            <a:ext cx="244633" cy="2097927"/>
           </a:xfrm>
           <a:prstGeom prst="rightBrace">
             <a:avLst>

</xml_diff>